<commit_message>
moved more and added another sept
</commit_message>
<xml_diff>
--- a/IDPA/Maybe They Should Stop Selling Ammo.pptx
+++ b/IDPA/Maybe They Should Stop Selling Ammo.pptx
@@ -4399,14 +4399,14 @@
           <p:nvPr>
             <p:extLst>
               <p:ext uri="{D42A27DB-BD31-4B8C-83A1-F6EECF244321}">
-                <p14:modId xmlns:p14="http://schemas.microsoft.com/office/powerpoint/2010/main" val="1530293140"/>
+                <p14:modId xmlns:p14="http://schemas.microsoft.com/office/powerpoint/2010/main" val="2386506420"/>
               </p:ext>
             </p:extLst>
           </p:nvPr>
         </p:nvGraphicFramePr>
         <p:xfrm>
           <a:off x="152400" y="152400"/>
-          <a:ext cx="7010400" cy="3810000"/>
+          <a:ext cx="7010400" cy="3711416"/>
         </p:xfrm>
         <a:graphic>
           <a:graphicData uri="http://schemas.openxmlformats.org/drawingml/2006/table">
@@ -4852,7 +4852,22 @@
                           <a:ea typeface="ＭＳ Ｐゴシック" pitchFamily="-112" charset="-128"/>
                           <a:cs typeface="Times New Roman" pitchFamily="-112" charset="0"/>
                         </a:rPr>
-                        <a:t>SCENARIO: While shopping at your local Walmart, you hear a commotion. Suddenly, what we can only assume are a bunch of deranged idiots, show up in front of you. Lucky for you, the store stopped selling ammo so they have none to reload, and you’re gunned up to the teeth. Do what good guys with guns do and protect yourself and those around you.</a:t>
+                        <a:t>SCENARIO:</a:t>
+                      </a:r>
+                      <a:r>
+                        <a:rPr kumimoji="0" lang="en-US" sz="1100" b="0" i="0" u="none" strike="noStrike" cap="none" normalizeH="0" baseline="0" dirty="0">
+                          <a:ln>
+                            <a:noFill/>
+                          </a:ln>
+                          <a:solidFill>
+                            <a:schemeClr val="tx1"/>
+                          </a:solidFill>
+                          <a:effectLst/>
+                          <a:latin typeface="Arial" charset="0"/>
+                          <a:ea typeface="ＭＳ Ｐゴシック" pitchFamily="-112" charset="-128"/>
+                          <a:cs typeface="Times New Roman" pitchFamily="-112" charset="0"/>
+                        </a:rPr>
+                        <a:t> While shopping at your local Walmart, you hear a commotion. Suddenly, what we can only assume are a bunch of deranged idiots, show up in front of you. Lucky for you, the store stopped selling ammo so they have none to reload, and you’re gunned up to the teeth. Do what good guys with guns do and protect yourself and those around you.</a:t>
                       </a:r>
                     </a:p>
                   </a:txBody>
@@ -4975,7 +4990,22 @@
                           <a:ea typeface="ＭＳ Ｐゴシック" pitchFamily="-112" charset="-128"/>
                           <a:cs typeface="Times New Roman" pitchFamily="-112" charset="0"/>
                         </a:rPr>
-                        <a:t>START POSITION: Standing in Start box, gun loaded and holstered.</a:t>
+                        <a:t>START POSITION: </a:t>
+                      </a:r>
+                      <a:r>
+                        <a:rPr kumimoji="0" lang="en-US" sz="1100" b="0" i="0" u="none" strike="noStrike" cap="none" normalizeH="0" baseline="0" dirty="0">
+                          <a:ln>
+                            <a:noFill/>
+                          </a:ln>
+                          <a:solidFill>
+                            <a:schemeClr val="tx1"/>
+                          </a:solidFill>
+                          <a:effectLst/>
+                          <a:latin typeface="Arial" charset="0"/>
+                          <a:ea typeface="ＭＳ Ｐゴシック" pitchFamily="-112" charset="-128"/>
+                          <a:cs typeface="Times New Roman" pitchFamily="-112" charset="0"/>
+                        </a:rPr>
+                        <a:t>Standing in Start box, gun loaded and holstered.</a:t>
                       </a:r>
                     </a:p>
                     <a:p>
@@ -4996,7 +5026,7 @@
                         <a:tabLst/>
                       </a:pPr>
                       <a:r>
-                        <a:rPr kumimoji="0" lang="en-US" sz="1100" b="1" i="0" u="none" strike="noStrike" cap="none" normalizeH="0" baseline="0" dirty="0">
+                        <a:rPr kumimoji="0" lang="en-US" sz="1100" b="0" i="0" u="none" strike="noStrike" cap="none" normalizeH="0" baseline="0" dirty="0">
                           <a:ln>
                             <a:noFill/>
                           </a:ln>
@@ -5502,7 +5532,22 @@
                           <a:ea typeface="ＭＳ Ｐゴシック" pitchFamily="-112" charset="-128"/>
                           <a:cs typeface="Times New Roman" pitchFamily="-112" charset="0"/>
                         </a:rPr>
-                        <a:t>STAGE PROCEDURE: At start signal, engage T1 and T2 in tactical priority and in the open.</a:t>
+                        <a:t>STAGE PROCEDURE:</a:t>
+                      </a:r>
+                      <a:r>
+                        <a:rPr kumimoji="0" lang="en-US" sz="1100" b="0" i="0" u="none" strike="noStrike" cap="none" normalizeH="0" baseline="0" dirty="0">
+                          <a:ln>
+                            <a:noFill/>
+                          </a:ln>
+                          <a:solidFill>
+                            <a:schemeClr val="tx1"/>
+                          </a:solidFill>
+                          <a:effectLst/>
+                          <a:latin typeface="Arial" charset="0"/>
+                          <a:ea typeface="ＭＳ Ｐゴシック" pitchFamily="-112" charset="-128"/>
+                          <a:cs typeface="Times New Roman" pitchFamily="-112" charset="0"/>
+                        </a:rPr>
+                        <a:t> At start signal, engage T1 and T2 in tactical priority and in the open.</a:t>
                       </a:r>
                     </a:p>
                     <a:p>
@@ -5523,7 +5568,7 @@
                         <a:tabLst/>
                       </a:pPr>
                       <a:r>
-                        <a:rPr kumimoji="0" lang="en-US" sz="1100" b="1" i="0" u="none" strike="noStrike" cap="none" normalizeH="0" baseline="0" dirty="0">
+                        <a:rPr kumimoji="0" lang="en-US" sz="1100" b="0" i="0" u="none" strike="noStrike" cap="none" normalizeH="0" baseline="0" dirty="0">
                           <a:ln>
                             <a:noFill/>
                           </a:ln>

</xml_diff>